<commit_message>
Updates the layout of the code review for clarity
Tried some design to make that stand out better.
</commit_message>
<xml_diff>
--- a/03-why_use_custom_resources.pptx
+++ b/03-why_use_custom_resources.pptx
@@ -164,7 +164,7 @@
   </p:defaultTextStyle>
   <p:extLst>
     <p:ext uri="{EFAFB233-063F-42B5-8137-9DF3F51BA10A}">
-      <p15:sldGuideLst xmlns:p15="http://schemas.microsoft.com/office/powerpoint/2012/main" xmlns="">
+      <p15:sldGuideLst xmlns:p15="http://schemas.microsoft.com/office/powerpoint/2012/main">
         <p15:guide id="1" orient="horz" pos="1392" userDrawn="1">
           <p15:clr>
             <a:srgbClr val="A4A3A4"/>
@@ -175,10 +175,15 @@
             <a:srgbClr val="A4A3A4"/>
           </p15:clr>
         </p15:guide>
+        <p15:guide id="3" orient="horz" pos="2052">
+          <p15:clr>
+            <a:srgbClr val="A4A3A4"/>
+          </p15:clr>
+        </p15:guide>
       </p15:sldGuideLst>
     </p:ext>
     <p:ext uri="{2D200454-40CA-4A62-9FC3-DE9A4176ACB9}">
-      <p15:notesGuideLst xmlns:p15="http://schemas.microsoft.com/office/powerpoint/2012/main" xmlns=""/>
+      <p15:notesGuideLst xmlns:p15="http://schemas.microsoft.com/office/powerpoint/2012/main"/>
     </p:ext>
   </p:extLst>
 </p:presentation>
@@ -295,7 +300,7 @@
               <a:pPr>
                 <a:defRPr/>
               </a:pPr>
-              <a:t>10/11/16</a:t>
+              <a:t>2016-10-23</a:t>
             </a:fld>
             <a:endParaRPr lang="en-US" dirty="0"/>
           </a:p>
@@ -478,7 +483,7 @@
               <a:pPr>
                 <a:defRPr/>
               </a:pPr>
-              <a:t>10/11/16</a:t>
+              <a:t>2016-10-23</a:t>
             </a:fld>
             <a:endParaRPr lang="en-US" dirty="0"/>
           </a:p>
@@ -3691,7 +3696,7 @@
   <p:clrMapOvr>
     <a:masterClrMapping/>
   </p:clrMapOvr>
-  <p:transition xmlns:p14="http://schemas.microsoft.com/office/powerpoint/2010/main" spd="med">
+  <p:transition spd="med">
     <p:fade/>
   </p:transition>
 </p:sldLayout>
@@ -3986,7 +3991,7 @@
   <p:clrMapOvr>
     <a:overrideClrMapping bg1="lt1" tx1="dk1" bg2="lt2" tx2="dk2" accent1="accent1" accent2="accent2" accent3="accent3" accent4="accent4" accent5="accent5" accent6="accent6" hlink="hlink" folHlink="folHlink"/>
   </p:clrMapOvr>
-  <p:transition xmlns:p14="http://schemas.microsoft.com/office/powerpoint/2010/main" spd="med">
+  <p:transition spd="med">
     <p:fade/>
   </p:transition>
 </p:sldLayout>
@@ -4119,14 +4124,14 @@
           </a:ln>
           <a:extLst>
             <a:ext uri="{909E8E84-426E-40dd-AFC4-6F175D3DCCD1}">
-              <a14:hiddenFill xmlns:a14="http://schemas.microsoft.com/office/drawing/2010/main">
+              <a14:hiddenFill xmlns:a14="http://schemas.microsoft.com/office/drawing/2010/main" xmlns="">
                 <a:solidFill>
                   <a:srgbClr val="FFFFFF"/>
                 </a:solidFill>
               </a14:hiddenFill>
             </a:ext>
             <a:ext uri="{91240B29-F687-4f45-9708-019B960494DF}">
-              <a14:hiddenLine xmlns:a14="http://schemas.microsoft.com/office/drawing/2010/main" w="9525">
+              <a14:hiddenLine xmlns:a14="http://schemas.microsoft.com/office/drawing/2010/main" xmlns="" w="9525">
                 <a:solidFill>
                   <a:srgbClr val="000000"/>
                 </a:solidFill>
@@ -4274,14 +4279,14 @@
           </a:ln>
           <a:extLst>
             <a:ext uri="{909E8E84-426E-40dd-AFC4-6F175D3DCCD1}">
-              <a14:hiddenFill xmlns:a14="http://schemas.microsoft.com/office/drawing/2010/main">
+              <a14:hiddenFill xmlns:a14="http://schemas.microsoft.com/office/drawing/2010/main" xmlns="">
                 <a:solidFill>
                   <a:srgbClr val="FFFFFF"/>
                 </a:solidFill>
               </a14:hiddenFill>
             </a:ext>
             <a:ext uri="{91240B29-F687-4f45-9708-019B960494DF}">
-              <a14:hiddenLine xmlns:a14="http://schemas.microsoft.com/office/drawing/2010/main" w="9525">
+              <a14:hiddenLine xmlns:a14="http://schemas.microsoft.com/office/drawing/2010/main" xmlns="" w="9525">
                 <a:solidFill>
                   <a:srgbClr val="000000"/>
                 </a:solidFill>
@@ -4679,7 +4684,7 @@
   <p:clrMapOvr>
     <a:overrideClrMapping bg1="lt1" tx1="dk1" bg2="lt2" tx2="dk2" accent1="accent1" accent2="accent2" accent3="accent3" accent4="accent4" accent5="accent5" accent6="accent6" hlink="hlink" folHlink="folHlink"/>
   </p:clrMapOvr>
-  <p:transition xmlns:p14="http://schemas.microsoft.com/office/powerpoint/2010/main" spd="med">
+  <p:transition spd="med">
     <p:fade/>
   </p:transition>
 </p:sldLayout>
@@ -4772,14 +4777,14 @@
           </a:ln>
           <a:extLst>
             <a:ext uri="{909E8E84-426E-40dd-AFC4-6F175D3DCCD1}">
-              <a14:hiddenFill xmlns:a14="http://schemas.microsoft.com/office/drawing/2010/main">
+              <a14:hiddenFill xmlns:a14="http://schemas.microsoft.com/office/drawing/2010/main" xmlns="">
                 <a:solidFill>
                   <a:srgbClr val="FFFFFF"/>
                 </a:solidFill>
               </a14:hiddenFill>
             </a:ext>
             <a:ext uri="{91240B29-F687-4f45-9708-019B960494DF}">
-              <a14:hiddenLine xmlns:a14="http://schemas.microsoft.com/office/drawing/2010/main" w="9525">
+              <a14:hiddenLine xmlns:a14="http://schemas.microsoft.com/office/drawing/2010/main" xmlns="" w="9525">
                 <a:solidFill>
                   <a:srgbClr val="000000"/>
                 </a:solidFill>
@@ -4801,7 +4806,7 @@
   <p:clrMapOvr>
     <a:masterClrMapping/>
   </p:clrMapOvr>
-  <p:transition xmlns:p14="http://schemas.microsoft.com/office/powerpoint/2010/main" spd="med">
+  <p:transition spd="med">
     <p:fade/>
   </p:transition>
 </p:sldLayout>
@@ -5088,7 +5093,7 @@
   <p:clrMapOvr>
     <a:masterClrMapping/>
   </p:clrMapOvr>
-  <p:transition xmlns:p14="http://schemas.microsoft.com/office/powerpoint/2010/main" spd="med">
+  <p:transition spd="med">
     <p:fade/>
   </p:transition>
 </p:sldLayout>
@@ -5375,7 +5380,7 @@
   <p:clrMapOvr>
     <a:masterClrMapping/>
   </p:clrMapOvr>
-  <p:transition xmlns:p14="http://schemas.microsoft.com/office/powerpoint/2010/main" spd="med">
+  <p:transition spd="med">
     <p:fade/>
   </p:transition>
 </p:sldLayout>
@@ -5724,7 +5729,7 @@
   <p:clrMapOvr>
     <a:masterClrMapping/>
   </p:clrMapOvr>
-  <p:transition xmlns:p14="http://schemas.microsoft.com/office/powerpoint/2010/main" spd="med">
+  <p:transition spd="med">
     <p:fade/>
   </p:transition>
 </p:sldLayout>
@@ -6011,7 +6016,7 @@
   <p:clrMapOvr>
     <a:masterClrMapping/>
   </p:clrMapOvr>
-  <p:transition xmlns:p14="http://schemas.microsoft.com/office/powerpoint/2010/main" spd="med">
+  <p:transition spd="med">
     <p:fade/>
   </p:transition>
 </p:sldLayout>
@@ -6228,14 +6233,14 @@
           </a:ln>
           <a:extLst>
             <a:ext uri="{909E8E84-426E-40dd-AFC4-6F175D3DCCD1}">
-              <a14:hiddenFill xmlns:a14="http://schemas.microsoft.com/office/drawing/2010/main">
+              <a14:hiddenFill xmlns:a14="http://schemas.microsoft.com/office/drawing/2010/main" xmlns="">
                 <a:solidFill>
                   <a:srgbClr val="FFFFFF"/>
                 </a:solidFill>
               </a14:hiddenFill>
             </a:ext>
             <a:ext uri="{91240B29-F687-4f45-9708-019B960494DF}">
-              <a14:hiddenLine xmlns:a14="http://schemas.microsoft.com/office/drawing/2010/main" w="9525">
+              <a14:hiddenLine xmlns:a14="http://schemas.microsoft.com/office/drawing/2010/main" xmlns="" w="9525">
                 <a:solidFill>
                   <a:srgbClr val="000000"/>
                 </a:solidFill>
@@ -6432,7 +6437,7 @@
   <p:clrMapOvr>
     <a:masterClrMapping/>
   </p:clrMapOvr>
-  <p:transition xmlns:p14="http://schemas.microsoft.com/office/powerpoint/2010/main" spd="med">
+  <p:transition spd="med">
     <p:fade/>
   </p:transition>
 </p:sldLayout>
@@ -6720,7 +6725,7 @@
   <p:clrMapOvr>
     <a:masterClrMapping/>
   </p:clrMapOvr>
-  <p:transition xmlns:p14="http://schemas.microsoft.com/office/powerpoint/2010/main" spd="med">
+  <p:transition spd="med">
     <p:fade/>
   </p:transition>
 </p:sldLayout>
@@ -7032,7 +7037,7 @@
   <p:clrMapOvr>
     <a:masterClrMapping/>
   </p:clrMapOvr>
-  <p:transition xmlns:p14="http://schemas.microsoft.com/office/powerpoint/2010/main" spd="med">
+  <p:transition spd="med">
     <p:fade/>
   </p:transition>
 </p:sldLayout>
@@ -7209,7 +7214,7 @@
   <p:clrMapOvr>
     <a:masterClrMapping/>
   </p:clrMapOvr>
-  <p:transition xmlns:p14="http://schemas.microsoft.com/office/powerpoint/2010/main" spd="med">
+  <p:transition spd="med">
     <p:fade/>
   </p:transition>
 </p:sldLayout>
@@ -7513,7 +7518,7 @@
   <p:clrMapOvr>
     <a:masterClrMapping/>
   </p:clrMapOvr>
-  <p:transition xmlns:p14="http://schemas.microsoft.com/office/powerpoint/2010/main" spd="med">
+  <p:transition spd="med">
     <p:fade/>
   </p:transition>
 </p:sldLayout>
@@ -7589,14 +7594,14 @@
           </a:ln>
           <a:extLst>
             <a:ext uri="{909E8E84-426E-40dd-AFC4-6F175D3DCCD1}">
-              <a14:hiddenFill xmlns:a14="http://schemas.microsoft.com/office/drawing/2010/main">
+              <a14:hiddenFill xmlns:a14="http://schemas.microsoft.com/office/drawing/2010/main" xmlns="">
                 <a:solidFill>
                   <a:srgbClr val="FFFFFF"/>
                 </a:solidFill>
               </a14:hiddenFill>
             </a:ext>
             <a:ext uri="{91240B29-F687-4f45-9708-019B960494DF}">
-              <a14:hiddenLine xmlns:a14="http://schemas.microsoft.com/office/drawing/2010/main" w="9525">
+              <a14:hiddenLine xmlns:a14="http://schemas.microsoft.com/office/drawing/2010/main" xmlns="" w="9525">
                 <a:solidFill>
                   <a:srgbClr val="000000"/>
                 </a:solidFill>
@@ -7872,7 +7877,7 @@
   <p:clrMapOvr>
     <a:overrideClrMapping bg1="lt1" tx1="dk1" bg2="lt2" tx2="dk2" accent1="accent1" accent2="accent2" accent3="accent3" accent4="accent4" accent5="accent5" accent6="accent6" hlink="hlink" folHlink="folHlink"/>
   </p:clrMapOvr>
-  <p:transition xmlns:p14="http://schemas.microsoft.com/office/powerpoint/2010/main" spd="med">
+  <p:transition spd="med">
     <p:fade/>
   </p:transition>
 </p:sldLayout>
@@ -8078,7 +8083,7 @@
   <p:clrMapOvr>
     <a:overrideClrMapping bg1="lt1" tx1="dk1" bg2="lt2" tx2="dk2" accent1="accent1" accent2="accent2" accent3="accent3" accent4="accent4" accent5="accent5" accent6="accent6" hlink="hlink" folHlink="folHlink"/>
   </p:clrMapOvr>
-  <p:transition xmlns:p14="http://schemas.microsoft.com/office/powerpoint/2010/main" spd="med">
+  <p:transition spd="med">
     <p:fade/>
   </p:transition>
 </p:sldLayout>
@@ -8154,14 +8159,14 @@
           </a:ln>
           <a:extLst>
             <a:ext uri="{909E8E84-426E-40dd-AFC4-6F175D3DCCD1}">
-              <a14:hiddenFill xmlns:a14="http://schemas.microsoft.com/office/drawing/2010/main">
+              <a14:hiddenFill xmlns:a14="http://schemas.microsoft.com/office/drawing/2010/main" xmlns="">
                 <a:solidFill>
                   <a:srgbClr val="FFFFFF"/>
                 </a:solidFill>
               </a14:hiddenFill>
             </a:ext>
             <a:ext uri="{91240B29-F687-4f45-9708-019B960494DF}">
-              <a14:hiddenLine xmlns:a14="http://schemas.microsoft.com/office/drawing/2010/main" w="9525">
+              <a14:hiddenLine xmlns:a14="http://schemas.microsoft.com/office/drawing/2010/main" xmlns="" w="9525">
                 <a:solidFill>
                   <a:srgbClr val="000000"/>
                 </a:solidFill>
@@ -8444,7 +8449,7 @@
   <p:clrMapOvr>
     <a:overrideClrMapping bg1="lt1" tx1="dk1" bg2="lt2" tx2="dk2" accent1="accent1" accent2="accent2" accent3="accent3" accent4="accent4" accent5="accent5" accent6="accent6" hlink="hlink" folHlink="folHlink"/>
   </p:clrMapOvr>
-  <p:transition xmlns:p14="http://schemas.microsoft.com/office/powerpoint/2010/main" spd="med">
+  <p:transition spd="med">
     <p:fade/>
   </p:transition>
 </p:sldLayout>
@@ -8652,7 +8657,7 @@
   <p:clrMapOvr>
     <a:overrideClrMapping bg1="lt1" tx1="dk1" bg2="lt2" tx2="dk2" accent1="accent1" accent2="accent2" accent3="accent3" accent4="accent4" accent5="accent5" accent6="accent6" hlink="hlink" folHlink="folHlink"/>
   </p:clrMapOvr>
-  <p:transition xmlns:p14="http://schemas.microsoft.com/office/powerpoint/2010/main" spd="med">
+  <p:transition spd="med">
     <p:fade/>
   </p:transition>
 </p:sldLayout>
@@ -8728,14 +8733,14 @@
           </a:ln>
           <a:extLst>
             <a:ext uri="{909E8E84-426E-40dd-AFC4-6F175D3DCCD1}">
-              <a14:hiddenFill xmlns:a14="http://schemas.microsoft.com/office/drawing/2010/main">
+              <a14:hiddenFill xmlns:a14="http://schemas.microsoft.com/office/drawing/2010/main" xmlns="">
                 <a:solidFill>
                   <a:srgbClr val="FFFFFF"/>
                 </a:solidFill>
               </a14:hiddenFill>
             </a:ext>
             <a:ext uri="{91240B29-F687-4f45-9708-019B960494DF}">
-              <a14:hiddenLine xmlns:a14="http://schemas.microsoft.com/office/drawing/2010/main" w="9525">
+              <a14:hiddenLine xmlns:a14="http://schemas.microsoft.com/office/drawing/2010/main" xmlns="" w="9525">
                 <a:solidFill>
                   <a:srgbClr val="000000"/>
                 </a:solidFill>
@@ -9003,7 +9008,7 @@
   <p:clrMapOvr>
     <a:overrideClrMapping bg1="lt1" tx1="dk1" bg2="lt2" tx2="dk2" accent1="accent1" accent2="accent2" accent3="accent3" accent4="accent4" accent5="accent5" accent6="accent6" hlink="hlink" folHlink="folHlink"/>
   </p:clrMapOvr>
-  <p:transition xmlns:p14="http://schemas.microsoft.com/office/powerpoint/2010/main" spd="med">
+  <p:transition spd="med">
     <p:fade/>
   </p:transition>
 </p:sldLayout>
@@ -9231,7 +9236,7 @@
   <p:clrMapOvr>
     <a:overrideClrMapping bg1="lt1" tx1="dk1" bg2="lt2" tx2="dk2" accent1="accent1" accent2="accent2" accent3="accent3" accent4="accent4" accent5="accent5" accent6="accent6" hlink="hlink" folHlink="folHlink"/>
   </p:clrMapOvr>
-  <p:transition xmlns:p14="http://schemas.microsoft.com/office/powerpoint/2010/main" spd="med">
+  <p:transition spd="med">
     <p:fade/>
   </p:transition>
 </p:sldLayout>
@@ -9519,7 +9524,7 @@
   <p:clrMapOvr>
     <a:overrideClrMapping bg1="lt1" tx1="dk1" bg2="lt2" tx2="dk2" accent1="accent1" accent2="accent2" accent3="accent3" accent4="accent4" accent5="accent5" accent6="accent6" hlink="hlink" folHlink="folHlink"/>
   </p:clrMapOvr>
-  <p:transition xmlns:p14="http://schemas.microsoft.com/office/powerpoint/2010/main" spd="med">
+  <p:transition spd="med">
     <p:fade/>
   </p:transition>
 </p:sldLayout>
@@ -9675,14 +9680,14 @@
           </a:ln>
           <a:extLst>
             <a:ext uri="{909E8E84-426E-40dd-AFC4-6F175D3DCCD1}">
-              <a14:hiddenFill xmlns:a14="http://schemas.microsoft.com/office/drawing/2010/main">
+              <a14:hiddenFill xmlns:a14="http://schemas.microsoft.com/office/drawing/2010/main" xmlns="">
                 <a:solidFill>
                   <a:srgbClr val="FFFFFF"/>
                 </a:solidFill>
               </a14:hiddenFill>
             </a:ext>
             <a:ext uri="{91240B29-F687-4f45-9708-019B960494DF}">
-              <a14:hiddenLine xmlns:a14="http://schemas.microsoft.com/office/drawing/2010/main" w="9525">
+              <a14:hiddenLine xmlns:a14="http://schemas.microsoft.com/office/drawing/2010/main" xmlns="" w="9525">
                 <a:solidFill>
                   <a:srgbClr val="000000"/>
                 </a:solidFill>
@@ -9921,13 +9926,13 @@
     <p:sldLayoutId id="2147483841" r:id="rId11"/>
     <p:sldLayoutId id="2147483843" r:id="rId12"/>
   </p:sldLayoutIdLst>
-  <p:transition xmlns:p14="http://schemas.microsoft.com/office/powerpoint/2010/main" spd="med">
+  <p:transition spd="med">
     <p:fade/>
   </p:transition>
   <p:timing>
     <p:tnLst>
       <p:par>
-        <p:cTn xmlns:p14="http://schemas.microsoft.com/office/powerpoint/2010/main" id="1" dur="indefinite" restart="never" nodeType="tmRoot"/>
+        <p:cTn id="1" dur="indefinite" restart="never" nodeType="tmRoot"/>
       </p:par>
     </p:tnLst>
   </p:timing>
@@ -10455,14 +10460,14 @@
           </a:ln>
           <a:extLst>
             <a:ext uri="{909E8E84-426E-40dd-AFC4-6F175D3DCCD1}">
-              <a14:hiddenFill xmlns:a14="http://schemas.microsoft.com/office/drawing/2010/main">
+              <a14:hiddenFill xmlns:a14="http://schemas.microsoft.com/office/drawing/2010/main" xmlns="">
                 <a:solidFill>
                   <a:srgbClr val="FFFFFF"/>
                 </a:solidFill>
               </a14:hiddenFill>
             </a:ext>
             <a:ext uri="{91240B29-F687-4f45-9708-019B960494DF}">
-              <a14:hiddenLine xmlns:a14="http://schemas.microsoft.com/office/drawing/2010/main" w="9525">
+              <a14:hiddenLine xmlns:a14="http://schemas.microsoft.com/office/drawing/2010/main" xmlns="" w="9525">
                 <a:solidFill>
                   <a:srgbClr val="000000"/>
                 </a:solidFill>
@@ -10772,13 +10777,13 @@
     <p:sldLayoutId id="2147483856" r:id="rId7"/>
     <p:sldLayoutId id="2147483866" r:id="rId8"/>
   </p:sldLayoutIdLst>
-  <p:transition xmlns:p14="http://schemas.microsoft.com/office/powerpoint/2010/main" spd="med">
+  <p:transition spd="med">
     <p:fade/>
   </p:transition>
   <p:timing>
     <p:tnLst>
       <p:par>
-        <p:cTn xmlns:p14="http://schemas.microsoft.com/office/powerpoint/2010/main" id="1" dur="indefinite" restart="never" nodeType="tmRoot"/>
+        <p:cTn id="1" dur="indefinite" restart="never" nodeType="tmRoot"/>
       </p:par>
     </p:tnLst>
   </p:timing>
@@ -11272,13 +11277,13 @@
   <p:clrMapOvr>
     <a:masterClrMapping/>
   </p:clrMapOvr>
-  <p:transition xmlns:p14="http://schemas.microsoft.com/office/powerpoint/2010/main" spd="med">
+  <p:transition spd="med">
     <p:fade/>
   </p:transition>
   <p:timing>
     <p:tnLst>
       <p:par>
-        <p:cTn xmlns:p14="http://schemas.microsoft.com/office/powerpoint/2010/main" id="1" dur="indefinite" restart="never" nodeType="tmRoot"/>
+        <p:cTn id="1" dur="indefinite" restart="never" nodeType="tmRoot"/>
       </p:par>
     </p:tnLst>
   </p:timing>
@@ -11323,7 +11328,6 @@
               <a:rPr lang="en-US" dirty="0"/>
               <a:t>Software Quality Standards</a:t>
             </a:r>
-            <a:endParaRPr lang="en-US" dirty="0"/>
           </a:p>
         </p:txBody>
       </p:sp>
@@ -11539,7 +11543,6 @@
               <a:rPr lang="en-US" sz="3200" dirty="0"/>
               <a:t>it testable?</a:t>
             </a:r>
-            <a:endParaRPr lang="en-US" sz="3200" dirty="0"/>
           </a:p>
         </p:txBody>
       </p:sp>
@@ -11553,8 +11556,8 @@
         </p:nvSpPr>
         <p:spPr bwMode="white">
           <a:xfrm>
-            <a:off x="1671638" y="3271838"/>
-            <a:ext cx="4281488" cy="4681537"/>
+            <a:off x="1671637" y="3271838"/>
+            <a:ext cx="4344987" cy="4681537"/>
           </a:xfrm>
           <a:prstGeom prst="rect">
             <a:avLst/>
@@ -11869,13 +11872,13 @@
   <p:clrMapOvr>
     <a:masterClrMapping/>
   </p:clrMapOvr>
-  <p:transition xmlns:p14="http://schemas.microsoft.com/office/powerpoint/2010/main" spd="med">
+  <p:transition spd="med">
     <p:fade/>
   </p:transition>
   <p:timing>
     <p:tnLst>
       <p:par>
-        <p:cTn xmlns:p14="http://schemas.microsoft.com/office/powerpoint/2010/main" id="1" dur="indefinite" restart="never" nodeType="tmRoot"/>
+        <p:cTn id="1" dur="indefinite" restart="never" nodeType="tmRoot"/>
       </p:par>
     </p:tnLst>
   </p:timing>
@@ -11920,7 +11923,6 @@
               <a:rPr lang="en-US" dirty="0"/>
               <a:t>Software Quality Standards</a:t>
             </a:r>
-            <a:endParaRPr lang="en-US" dirty="0"/>
           </a:p>
         </p:txBody>
       </p:sp>
@@ -12458,13 +12460,13 @@
   <p:clrMapOvr>
     <a:masterClrMapping/>
   </p:clrMapOvr>
-  <p:transition xmlns:p14="http://schemas.microsoft.com/office/powerpoint/2010/main" spd="med">
+  <p:transition spd="med">
     <p:fade/>
   </p:transition>
   <p:timing>
     <p:tnLst>
       <p:par>
-        <p:cTn xmlns:p14="http://schemas.microsoft.com/office/powerpoint/2010/main" id="1" dur="indefinite" restart="never" nodeType="tmRoot"/>
+        <p:cTn id="1" dur="indefinite" restart="never" nodeType="tmRoot"/>
       </p:par>
     </p:tnLst>
   </p:timing>
@@ -12567,13 +12569,8 @@
             </a:pPr>
             <a:r>
               <a:rPr lang="en-US" dirty="0" smtClean="0"/>
-              <a:t>Evaluate </a:t>
-            </a:r>
-            <a:r>
-              <a:rPr lang="en-US" dirty="0" smtClean="0"/>
-              <a:t>a code sample</a:t>
-            </a:r>
-            <a:endParaRPr lang="en-US" dirty="0" smtClean="0"/>
+              <a:t>Evaluate a code sample</a:t>
+            </a:r>
           </a:p>
         </p:txBody>
       </p:sp>
@@ -12587,13 +12584,13 @@
   <p:clrMapOvr>
     <a:masterClrMapping/>
   </p:clrMapOvr>
-  <p:transition xmlns:p14="http://schemas.microsoft.com/office/powerpoint/2010/main" spd="med">
+  <p:transition spd="med">
     <p:fade/>
   </p:transition>
   <p:timing>
     <p:tnLst>
       <p:par>
-        <p:cTn xmlns:p14="http://schemas.microsoft.com/office/powerpoint/2010/main" id="1" dur="indefinite" restart="never" nodeType="tmRoot"/>
+        <p:cTn id="1" dur="indefinite" restart="never" nodeType="tmRoot"/>
       </p:par>
     </p:tnLst>
   </p:timing>
@@ -13027,6 +13024,11 @@
           <a:prstGeom prst="rect">
             <a:avLst/>
           </a:prstGeom>
+          <a:solidFill>
+            <a:schemeClr val="bg1">
+              <a:lumMod val="85000"/>
+            </a:schemeClr>
+          </a:solidFill>
         </p:spPr>
         <p:txBody>
           <a:bodyPr vert="horz" wrap="square" lIns="91440" tIns="91440" rIns="91440" bIns="91440" rtlCol="0" anchor="ctr">
@@ -13036,13 +13038,22 @@
           <a:p>
             <a:r>
               <a:rPr lang="en-US" b="1" dirty="0" smtClean="0"/>
-              <a:t>Functionality</a:t>
+              <a:t>Functionality </a:t>
             </a:r>
             <a:r>
               <a:rPr lang="en-US" dirty="0" smtClean="0"/>
-              <a:t> | Reliability | Usability | Efficiency | Maintainability | Portability </a:t>
-            </a:r>
-            <a:endParaRPr lang="en-US" dirty="0" smtClean="0"/>
+              <a:t>|</a:t>
+            </a:r>
+            <a:r>
+              <a:rPr lang="en-US" dirty="0" smtClean="0">
+                <a:solidFill>
+                  <a:schemeClr val="bg1">
+                    <a:lumMod val="50000"/>
+                  </a:schemeClr>
+                </a:solidFill>
+              </a:rPr>
+              <a:t> Reliability | Usability | Efficiency | Maintainability | Portability </a:t>
+            </a:r>
           </a:p>
         </p:txBody>
       </p:sp>
@@ -13071,7 +13082,6 @@
               <a:rPr lang="en-US" b="1" dirty="0"/>
               <a:t>Does the code accomplish what it is designed to accomplish?</a:t>
             </a:r>
-            <a:endParaRPr lang="en-US" b="1" dirty="0"/>
           </a:p>
         </p:txBody>
       </p:sp>
@@ -13085,13 +13095,13 @@
   <p:clrMapOvr>
     <a:masterClrMapping/>
   </p:clrMapOvr>
-  <p:transition xmlns:p14="http://schemas.microsoft.com/office/powerpoint/2010/main" spd="med">
+  <p:transition spd="med">
     <p:fade/>
   </p:transition>
   <p:timing>
     <p:tnLst>
       <p:par>
-        <p:cTn xmlns:p14="http://schemas.microsoft.com/office/powerpoint/2010/main" id="1" dur="indefinite" restart="never" nodeType="tmRoot"/>
+        <p:cTn id="1" dur="indefinite" restart="never" nodeType="tmRoot"/>
       </p:par>
     </p:tnLst>
   </p:timing>
@@ -13525,6 +13535,11 @@
           <a:prstGeom prst="rect">
             <a:avLst/>
           </a:prstGeom>
+          <a:solidFill>
+            <a:schemeClr val="bg1">
+              <a:lumMod val="85000"/>
+            </a:schemeClr>
+          </a:solidFill>
         </p:spPr>
         <p:txBody>
           <a:bodyPr vert="horz" wrap="square" lIns="91440" tIns="91440" rIns="91440" bIns="91440" rtlCol="0" anchor="ctr">
@@ -13533,8 +13548,18 @@
           <a:lstStyle/>
           <a:p>
             <a:r>
+              <a:rPr lang="en-US" dirty="0" smtClean="0">
+                <a:solidFill>
+                  <a:schemeClr val="bg1">
+                    <a:lumMod val="50000"/>
+                  </a:schemeClr>
+                </a:solidFill>
+              </a:rPr>
+              <a:t>Functionality</a:t>
+            </a:r>
+            <a:r>
               <a:rPr lang="en-US" dirty="0" smtClean="0"/>
-              <a:t>Functionality | </a:t>
+              <a:t> | </a:t>
             </a:r>
             <a:r>
               <a:rPr lang="en-US" b="1" dirty="0" smtClean="0"/>
@@ -13542,9 +13567,18 @@
             </a:r>
             <a:r>
               <a:rPr lang="en-US" dirty="0" smtClean="0"/>
-              <a:t> | Usability | Efficiency | Maintainability | Portability </a:t>
-            </a:r>
-            <a:endParaRPr lang="en-US" dirty="0" smtClean="0"/>
+              <a:t> | </a:t>
+            </a:r>
+            <a:r>
+              <a:rPr lang="en-US" dirty="0" smtClean="0">
+                <a:solidFill>
+                  <a:schemeClr val="bg1">
+                    <a:lumMod val="50000"/>
+                  </a:schemeClr>
+                </a:solidFill>
+              </a:rPr>
+              <a:t>Usability | Efficiency | Maintainability | Portability </a:t>
+            </a:r>
           </a:p>
         </p:txBody>
       </p:sp>
@@ -13573,7 +13607,6 @@
               <a:rPr lang="en-US" b="1" dirty="0"/>
               <a:t>Is the solution able to withstand fault and recover from a failure?</a:t>
             </a:r>
-            <a:endParaRPr lang="en-US" b="1" dirty="0"/>
           </a:p>
         </p:txBody>
       </p:sp>
@@ -13587,13 +13620,13 @@
   <p:clrMapOvr>
     <a:masterClrMapping/>
   </p:clrMapOvr>
-  <p:transition xmlns:p14="http://schemas.microsoft.com/office/powerpoint/2010/main" spd="med">
+  <p:transition spd="med">
     <p:fade/>
   </p:transition>
   <p:timing>
     <p:tnLst>
       <p:par>
-        <p:cTn xmlns:p14="http://schemas.microsoft.com/office/powerpoint/2010/main" id="1" dur="indefinite" restart="never" nodeType="tmRoot"/>
+        <p:cTn id="1" dur="indefinite" restart="never" nodeType="tmRoot"/>
       </p:par>
     </p:tnLst>
   </p:timing>
@@ -14027,6 +14060,11 @@
           <a:prstGeom prst="rect">
             <a:avLst/>
           </a:prstGeom>
+          <a:solidFill>
+            <a:schemeClr val="bg1">
+              <a:lumMod val="85000"/>
+            </a:schemeClr>
+          </a:solidFill>
         </p:spPr>
         <p:txBody>
           <a:bodyPr vert="horz" wrap="square" lIns="91440" tIns="91440" rIns="91440" bIns="91440" rtlCol="0" anchor="ctr">
@@ -14035,8 +14073,18 @@
           <a:lstStyle/>
           <a:p>
             <a:r>
+              <a:rPr lang="en-US" dirty="0" smtClean="0">
+                <a:solidFill>
+                  <a:schemeClr val="bg1">
+                    <a:lumMod val="50000"/>
+                  </a:schemeClr>
+                </a:solidFill>
+              </a:rPr>
+              <a:t>Functionality | Reliability </a:t>
+            </a:r>
+            <a:r>
               <a:rPr lang="en-US" dirty="0" smtClean="0"/>
-              <a:t>Functionality | Reliability | </a:t>
+              <a:t>| </a:t>
             </a:r>
             <a:r>
               <a:rPr lang="en-US" b="1" dirty="0" smtClean="0"/>
@@ -14044,9 +14092,18 @@
             </a:r>
             <a:r>
               <a:rPr lang="en-US" dirty="0" smtClean="0"/>
-              <a:t> | Efficiency | Maintainability | Portability </a:t>
-            </a:r>
-            <a:endParaRPr lang="en-US" dirty="0" smtClean="0"/>
+              <a:t> | </a:t>
+            </a:r>
+            <a:r>
+              <a:rPr lang="en-US" dirty="0" smtClean="0">
+                <a:solidFill>
+                  <a:schemeClr val="bg1">
+                    <a:lumMod val="50000"/>
+                  </a:schemeClr>
+                </a:solidFill>
+              </a:rPr>
+              <a:t>Efficiency | Maintainability | Portability </a:t>
+            </a:r>
           </a:p>
         </p:txBody>
       </p:sp>
@@ -14083,7 +14140,6 @@
               <a:rPr lang="en-US" b="1" dirty="0"/>
               <a:t>it easy to learn?</a:t>
             </a:r>
-            <a:endParaRPr lang="en-US" b="1" dirty="0"/>
           </a:p>
         </p:txBody>
       </p:sp>
@@ -14097,13 +14153,13 @@
   <p:clrMapOvr>
     <a:masterClrMapping/>
   </p:clrMapOvr>
-  <p:transition xmlns:p14="http://schemas.microsoft.com/office/powerpoint/2010/main" spd="med">
+  <p:transition spd="med">
     <p:fade/>
   </p:transition>
   <p:timing>
     <p:tnLst>
       <p:par>
-        <p:cTn xmlns:p14="http://schemas.microsoft.com/office/powerpoint/2010/main" id="1" dur="indefinite" restart="never" nodeType="tmRoot"/>
+        <p:cTn id="1" dur="indefinite" restart="never" nodeType="tmRoot"/>
       </p:par>
     </p:tnLst>
   </p:timing>
@@ -14537,6 +14593,11 @@
           <a:prstGeom prst="rect">
             <a:avLst/>
           </a:prstGeom>
+          <a:solidFill>
+            <a:schemeClr val="bg1">
+              <a:lumMod val="85000"/>
+            </a:schemeClr>
+          </a:solidFill>
         </p:spPr>
         <p:txBody>
           <a:bodyPr vert="horz" wrap="square" lIns="91440" tIns="91440" rIns="91440" bIns="91440" rtlCol="0" anchor="ctr">
@@ -14545,8 +14606,18 @@
           <a:lstStyle/>
           <a:p>
             <a:r>
+              <a:rPr lang="en-US" dirty="0" smtClean="0">
+                <a:solidFill>
+                  <a:schemeClr val="bg1">
+                    <a:lumMod val="50000"/>
+                  </a:schemeClr>
+                </a:solidFill>
+              </a:rPr>
+              <a:t>Functionality | Reliability | Usability </a:t>
+            </a:r>
+            <a:r>
               <a:rPr lang="en-US" dirty="0" smtClean="0"/>
-              <a:t>Functionality | Reliability | Usability | </a:t>
+              <a:t>| </a:t>
             </a:r>
             <a:r>
               <a:rPr lang="en-US" b="1" dirty="0" smtClean="0"/>
@@ -14554,9 +14625,18 @@
             </a:r>
             <a:r>
               <a:rPr lang="en-US" dirty="0" smtClean="0"/>
-              <a:t> | Maintainability | Portability </a:t>
-            </a:r>
-            <a:endParaRPr lang="en-US" dirty="0" smtClean="0"/>
+              <a:t> | </a:t>
+            </a:r>
+            <a:r>
+              <a:rPr lang="en-US" dirty="0" smtClean="0">
+                <a:solidFill>
+                  <a:schemeClr val="bg1">
+                    <a:lumMod val="50000"/>
+                  </a:schemeClr>
+                </a:solidFill>
+              </a:rPr>
+              <a:t>Maintainability | Portability </a:t>
+            </a:r>
           </a:p>
         </p:txBody>
       </p:sp>
@@ -14585,7 +14665,6 @@
               <a:rPr lang="en-US" b="1" dirty="0"/>
               <a:t>Does the code consume too many physical resources when it executes (e.g. CPU, memory)?</a:t>
             </a:r>
-            <a:endParaRPr lang="en-US" b="1" dirty="0"/>
           </a:p>
         </p:txBody>
       </p:sp>
@@ -14599,13 +14678,13 @@
   <p:clrMapOvr>
     <a:masterClrMapping/>
   </p:clrMapOvr>
-  <p:transition xmlns:p14="http://schemas.microsoft.com/office/powerpoint/2010/main" spd="med">
+  <p:transition spd="med">
     <p:fade/>
   </p:transition>
   <p:timing>
     <p:tnLst>
       <p:par>
-        <p:cTn xmlns:p14="http://schemas.microsoft.com/office/powerpoint/2010/main" id="1" dur="indefinite" restart="never" nodeType="tmRoot"/>
+        <p:cTn id="1" dur="indefinite" restart="never" nodeType="tmRoot"/>
       </p:par>
     </p:tnLst>
   </p:timing>
@@ -15039,6 +15118,11 @@
           <a:prstGeom prst="rect">
             <a:avLst/>
           </a:prstGeom>
+          <a:solidFill>
+            <a:schemeClr val="bg1">
+              <a:lumMod val="85000"/>
+            </a:schemeClr>
+          </a:solidFill>
         </p:spPr>
         <p:txBody>
           <a:bodyPr vert="horz" wrap="square" lIns="91440" tIns="91440" rIns="91440" bIns="91440" rtlCol="0" anchor="ctr">
@@ -15047,8 +15131,18 @@
           <a:lstStyle/>
           <a:p>
             <a:r>
+              <a:rPr lang="en-US" dirty="0" smtClean="0">
+                <a:solidFill>
+                  <a:schemeClr val="bg1">
+                    <a:lumMod val="50000"/>
+                  </a:schemeClr>
+                </a:solidFill>
+              </a:rPr>
+              <a:t>Functionality | Reliability | Usability | Efficiency </a:t>
+            </a:r>
+            <a:r>
               <a:rPr lang="en-US" dirty="0" smtClean="0"/>
-              <a:t>Functionality | Reliability | Usability | Efficiency | </a:t>
+              <a:t>| </a:t>
             </a:r>
             <a:r>
               <a:rPr lang="en-US" b="1" dirty="0" smtClean="0"/>
@@ -15056,9 +15150,18 @@
             </a:r>
             <a:r>
               <a:rPr lang="en-US" dirty="0" smtClean="0"/>
-              <a:t> | Portability </a:t>
-            </a:r>
-            <a:endParaRPr lang="en-US" dirty="0" smtClean="0"/>
+              <a:t> | </a:t>
+            </a:r>
+            <a:r>
+              <a:rPr lang="en-US" dirty="0" smtClean="0">
+                <a:solidFill>
+                  <a:schemeClr val="bg1">
+                    <a:lumMod val="50000"/>
+                  </a:schemeClr>
+                </a:solidFill>
+              </a:rPr>
+              <a:t>Portability </a:t>
+            </a:r>
           </a:p>
         </p:txBody>
       </p:sp>
@@ -15087,7 +15190,6 @@
               <a:rPr lang="en-US" b="1" dirty="0"/>
               <a:t>Are you able to easily adapt the solution? Is it testable?</a:t>
             </a:r>
-            <a:endParaRPr lang="en-US" b="1" dirty="0"/>
           </a:p>
         </p:txBody>
       </p:sp>
@@ -15101,13 +15203,13 @@
   <p:clrMapOvr>
     <a:masterClrMapping/>
   </p:clrMapOvr>
-  <p:transition xmlns:p14="http://schemas.microsoft.com/office/powerpoint/2010/main" spd="med">
+  <p:transition spd="med">
     <p:fade/>
   </p:transition>
   <p:timing>
     <p:tnLst>
       <p:par>
-        <p:cTn xmlns:p14="http://schemas.microsoft.com/office/powerpoint/2010/main" id="1" dur="indefinite" restart="never" nodeType="tmRoot"/>
+        <p:cTn id="1" dur="indefinite" restart="never" nodeType="tmRoot"/>
       </p:par>
     </p:tnLst>
   </p:timing>
@@ -15541,6 +15643,11 @@
           <a:prstGeom prst="rect">
             <a:avLst/>
           </a:prstGeom>
+          <a:solidFill>
+            <a:schemeClr val="bg1">
+              <a:lumMod val="85000"/>
+            </a:schemeClr>
+          </a:solidFill>
         </p:spPr>
         <p:txBody>
           <a:bodyPr vert="horz" wrap="square" lIns="91440" tIns="91440" rIns="91440" bIns="91440" rtlCol="0" anchor="ctr">
@@ -15549,14 +15656,23 @@
           <a:lstStyle/>
           <a:p>
             <a:r>
+              <a:rPr lang="en-US" dirty="0" smtClean="0">
+                <a:solidFill>
+                  <a:schemeClr val="bg1">
+                    <a:lumMod val="50000"/>
+                  </a:schemeClr>
+                </a:solidFill>
+              </a:rPr>
+              <a:t>Functionality | Reliability | Usability | Efficiency | Maintainability </a:t>
+            </a:r>
+            <a:r>
               <a:rPr lang="en-US" dirty="0" smtClean="0"/>
-              <a:t>Functionality | Reliability | Usability | Efficiency | Maintainability | </a:t>
+              <a:t>| </a:t>
             </a:r>
             <a:r>
               <a:rPr lang="en-US" b="1" dirty="0" smtClean="0"/>
               <a:t>Portability </a:t>
             </a:r>
-            <a:endParaRPr lang="en-US" b="1" dirty="0" smtClean="0"/>
           </a:p>
         </p:txBody>
       </p:sp>
@@ -15585,7 +15701,6 @@
               <a:rPr lang="en-US" b="1" dirty="0"/>
               <a:t>Can the software adapt to changes in its environment? Or changes to its requirements?</a:t>
             </a:r>
-            <a:endParaRPr lang="en-US" b="1" dirty="0"/>
           </a:p>
         </p:txBody>
       </p:sp>
@@ -15599,13 +15714,13 @@
   <p:clrMapOvr>
     <a:masterClrMapping/>
   </p:clrMapOvr>
-  <p:transition xmlns:p14="http://schemas.microsoft.com/office/powerpoint/2010/main" spd="med">
+  <p:transition spd="med">
     <p:fade/>
   </p:transition>
   <p:timing>
     <p:tnLst>
       <p:par>
-        <p:cTn xmlns:p14="http://schemas.microsoft.com/office/powerpoint/2010/main" id="1" dur="indefinite" restart="never" nodeType="tmRoot"/>
+        <p:cTn id="1" dur="indefinite" restart="never" nodeType="tmRoot"/>
       </p:par>
     </p:tnLst>
   </p:timing>
@@ -15650,7 +15765,6 @@
               <a:rPr lang="en-US" dirty="0"/>
               <a:t>Evaluation Before Pursuit</a:t>
             </a:r>
-            <a:endParaRPr lang="en-US" dirty="0"/>
           </a:p>
         </p:txBody>
       </p:sp>
@@ -15708,13 +15822,8 @@
             </a:pPr>
             <a:r>
               <a:rPr lang="en-US" dirty="0" smtClean="0"/>
-              <a:t>Evaluate </a:t>
-            </a:r>
-            <a:r>
-              <a:rPr lang="en-US" dirty="0" smtClean="0"/>
-              <a:t>a code sample</a:t>
-            </a:r>
-            <a:endParaRPr lang="en-US" dirty="0" smtClean="0"/>
+              <a:t>Evaluate a code sample</a:t>
+            </a:r>
           </a:p>
         </p:txBody>
       </p:sp>
@@ -15728,13 +15837,13 @@
   <p:clrMapOvr>
     <a:masterClrMapping/>
   </p:clrMapOvr>
-  <p:transition xmlns:p14="http://schemas.microsoft.com/office/powerpoint/2010/main" spd="med">
+  <p:transition spd="med">
     <p:fade/>
   </p:transition>
   <p:timing>
     <p:tnLst>
       <p:par>
-        <p:cTn xmlns:p14="http://schemas.microsoft.com/office/powerpoint/2010/main" id="1" dur="indefinite" restart="never" nodeType="tmRoot"/>
+        <p:cTn id="1" dur="indefinite" restart="never" nodeType="tmRoot"/>
       </p:par>
     </p:tnLst>
   </p:timing>
@@ -15835,13 +15944,13 @@
   <p:clrMapOvr>
     <a:masterClrMapping/>
   </p:clrMapOvr>
-  <p:transition xmlns:p14="http://schemas.microsoft.com/office/powerpoint/2010/main" spd="med">
+  <p:transition spd="med">
     <p:fade/>
   </p:transition>
   <p:timing>
     <p:tnLst>
       <p:par>
-        <p:cTn xmlns:p14="http://schemas.microsoft.com/office/powerpoint/2010/main" id="1" dur="indefinite" restart="never" nodeType="tmRoot"/>
+        <p:cTn id="1" dur="indefinite" restart="never" nodeType="tmRoot"/>
       </p:par>
     </p:tnLst>
   </p:timing>
@@ -15932,7 +16041,7 @@
   <p:clrMapOvr>
     <a:masterClrMapping/>
   </p:clrMapOvr>
-  <p:transition xmlns:p14="http://schemas.microsoft.com/office/powerpoint/2010/main" spd="med">
+  <p:transition spd="med">
     <p:fade/>
   </p:transition>
 </p:sld>
@@ -16013,13 +16122,13 @@
   <p:clrMapOvr>
     <a:masterClrMapping/>
   </p:clrMapOvr>
-  <p:transition xmlns:p14="http://schemas.microsoft.com/office/powerpoint/2010/main" spd="med">
+  <p:transition spd="med">
     <p:fade/>
   </p:transition>
   <p:timing>
     <p:tnLst>
       <p:par>
-        <p:cTn xmlns:p14="http://schemas.microsoft.com/office/powerpoint/2010/main" id="1" dur="indefinite" restart="never" nodeType="tmRoot"/>
+        <p:cTn id="1" dur="indefinite" restart="never" nodeType="tmRoot"/>
       </p:par>
     </p:tnLst>
   </p:timing>
@@ -16053,7 +16162,7 @@
   <p:clrMapOvr>
     <a:masterClrMapping/>
   </p:clrMapOvr>
-  <p:transition xmlns:p14="http://schemas.microsoft.com/office/powerpoint/2010/main" spd="med">
+  <p:transition spd="med">
     <p:fade/>
   </p:transition>
 </p:sld>
@@ -16155,13 +16264,8 @@
             </a:pPr>
             <a:r>
               <a:rPr lang="en-US" dirty="0" smtClean="0"/>
-              <a:t>Evaluate </a:t>
-            </a:r>
-            <a:r>
-              <a:rPr lang="en-US" dirty="0" smtClean="0"/>
-              <a:t>a code sample</a:t>
-            </a:r>
-            <a:endParaRPr lang="en-US" dirty="0" smtClean="0"/>
+              <a:t>Evaluate a code sample</a:t>
+            </a:r>
           </a:p>
         </p:txBody>
       </p:sp>
@@ -16175,7 +16279,7 @@
   <p:clrMapOvr>
     <a:masterClrMapping/>
   </p:clrMapOvr>
-  <p:transition xmlns:p14="http://schemas.microsoft.com/office/powerpoint/2010/main" spd="med">
+  <p:transition spd="med">
     <p:fade/>
   </p:transition>
 </p:sld>
@@ -16255,13 +16359,13 @@
   <p:clrMapOvr>
     <a:masterClrMapping/>
   </p:clrMapOvr>
-  <p:transition xmlns:p14="http://schemas.microsoft.com/office/powerpoint/2010/main" spd="med">
+  <p:transition spd="med">
     <p:fade/>
   </p:transition>
   <p:timing>
     <p:tnLst>
       <p:par>
-        <p:cTn xmlns:p14="http://schemas.microsoft.com/office/powerpoint/2010/main" id="1" dur="indefinite" restart="never" nodeType="tmRoot"/>
+        <p:cTn id="1" dur="indefinite" restart="never" nodeType="tmRoot"/>
       </p:par>
     </p:tnLst>
   </p:timing>
@@ -16625,13 +16729,13 @@
   <p:clrMapOvr>
     <a:masterClrMapping/>
   </p:clrMapOvr>
-  <p:transition xmlns:p14="http://schemas.microsoft.com/office/powerpoint/2010/main" spd="med">
+  <p:transition spd="med">
     <p:fade/>
   </p:transition>
   <p:timing>
     <p:tnLst>
       <p:par>
-        <p:cTn xmlns:p14="http://schemas.microsoft.com/office/powerpoint/2010/main" id="1" dur="indefinite" restart="never" nodeType="tmRoot"/>
+        <p:cTn id="1" dur="indefinite" restart="never" nodeType="tmRoot"/>
       </p:par>
     </p:tnLst>
   </p:timing>
@@ -16884,7 +16988,6 @@
               <a:rPr lang="en-US" sz="3200" dirty="0"/>
               <a:t>Does the code accomplish what it is designed to accomplish?</a:t>
             </a:r>
-            <a:endParaRPr lang="en-US" sz="3200" dirty="0"/>
           </a:p>
         </p:txBody>
       </p:sp>
@@ -17034,13 +17137,13 @@
   <p:clrMapOvr>
     <a:masterClrMapping/>
   </p:clrMapOvr>
-  <p:transition xmlns:p14="http://schemas.microsoft.com/office/powerpoint/2010/main" spd="med">
+  <p:transition spd="med">
     <p:fade/>
   </p:transition>
   <p:timing>
     <p:tnLst>
       <p:par>
-        <p:cTn xmlns:p14="http://schemas.microsoft.com/office/powerpoint/2010/main" id="1" dur="indefinite" restart="never" nodeType="tmRoot"/>
+        <p:cTn id="1" dur="indefinite" restart="never" nodeType="tmRoot"/>
       </p:par>
     </p:tnLst>
   </p:timing>
@@ -17085,7 +17188,6 @@
               <a:rPr lang="en-US" dirty="0"/>
               <a:t>Software Quality Standards</a:t>
             </a:r>
-            <a:endParaRPr lang="en-US" dirty="0"/>
           </a:p>
         </p:txBody>
       </p:sp>
@@ -17443,13 +17545,13 @@
   <p:clrMapOvr>
     <a:masterClrMapping/>
   </p:clrMapOvr>
-  <p:transition xmlns:p14="http://schemas.microsoft.com/office/powerpoint/2010/main" spd="med">
+  <p:transition spd="med">
     <p:fade/>
   </p:transition>
   <p:timing>
     <p:tnLst>
       <p:par>
-        <p:cTn xmlns:p14="http://schemas.microsoft.com/office/powerpoint/2010/main" id="1" dur="indefinite" restart="never" nodeType="tmRoot"/>
+        <p:cTn id="1" dur="indefinite" restart="never" nodeType="tmRoot"/>
       </p:par>
     </p:tnLst>
   </p:timing>
@@ -17494,7 +17596,6 @@
               <a:rPr lang="en-US" dirty="0"/>
               <a:t>Software Quality Standards</a:t>
             </a:r>
-            <a:endParaRPr lang="en-US" dirty="0"/>
           </a:p>
         </p:txBody>
       </p:sp>
@@ -17858,13 +17959,13 @@
   <p:clrMapOvr>
     <a:masterClrMapping/>
   </p:clrMapOvr>
-  <p:transition xmlns:p14="http://schemas.microsoft.com/office/powerpoint/2010/main" spd="med">
+  <p:transition spd="med">
     <p:fade/>
   </p:transition>
   <p:timing>
     <p:tnLst>
       <p:par>
-        <p:cTn xmlns:p14="http://schemas.microsoft.com/office/powerpoint/2010/main" id="1" dur="indefinite" restart="never" nodeType="tmRoot"/>
+        <p:cTn id="1" dur="indefinite" restart="never" nodeType="tmRoot"/>
       </p:par>
     </p:tnLst>
   </p:timing>
@@ -17909,7 +18010,6 @@
               <a:rPr lang="en-US" dirty="0"/>
               <a:t>Software Quality Standards</a:t>
             </a:r>
-            <a:endParaRPr lang="en-US" dirty="0"/>
           </a:p>
         </p:txBody>
       </p:sp>
@@ -18267,13 +18367,13 @@
   <p:clrMapOvr>
     <a:masterClrMapping/>
   </p:clrMapOvr>
-  <p:transition xmlns:p14="http://schemas.microsoft.com/office/powerpoint/2010/main" spd="med">
+  <p:transition spd="med">
     <p:fade/>
   </p:transition>
   <p:timing>
     <p:tnLst>
       <p:par>
-        <p:cTn xmlns:p14="http://schemas.microsoft.com/office/powerpoint/2010/main" id="1" dur="indefinite" restart="never" nodeType="tmRoot"/>
+        <p:cTn id="1" dur="indefinite" restart="never" nodeType="tmRoot"/>
       </p:par>
     </p:tnLst>
   </p:timing>
@@ -18656,7 +18756,7 @@
   <a:extraClrSchemeLst/>
   <a:extLst>
     <a:ext uri="{05A4C25C-085E-4340-85A3-A5531E510DB2}">
-      <thm15:themeFamily xmlns:thm15="http://schemas.microsoft.com/office/thememl/2012/main" xmlns="" name="Chef-TemplateComps_v09-16x9-Light.potx" id="{078CEFDB-FA7A-4E36-9964-13EF367585CB}" vid="{8B87B0F3-7308-43D5-8388-E1B49EA02652}"/>
+      <thm15:themeFamily xmlns:thm15="http://schemas.microsoft.com/office/thememl/2012/main" name="Chef-TemplateComps_v09-16x9-Light.potx" id="{078CEFDB-FA7A-4E36-9964-13EF367585CB}" vid="{8B87B0F3-7308-43D5-8388-E1B49EA02652}"/>
     </a:ext>
   </a:extLst>
 </a:theme>
@@ -19038,7 +19138,7 @@
   <a:extraClrSchemeLst/>
   <a:extLst>
     <a:ext uri="{05A4C25C-085E-4340-85A3-A5531E510DB2}">
-      <thm15:themeFamily xmlns:thm15="http://schemas.microsoft.com/office/thememl/2012/main" xmlns="" name="Chef-TemplateComps_v09-16x9-Light.potx" id="{078CEFDB-FA7A-4E36-9964-13EF367585CB}" vid="{8B87B0F3-7308-43D5-8388-E1B49EA02652}"/>
+      <thm15:themeFamily xmlns:thm15="http://schemas.microsoft.com/office/thememl/2012/main" name="Chef-TemplateComps_v09-16x9-Light.potx" id="{078CEFDB-FA7A-4E36-9964-13EF367585CB}" vid="{8B87B0F3-7308-43D5-8388-E1B49EA02652}"/>
     </a:ext>
   </a:extLst>
 </a:theme>

</xml_diff>